<commit_message>
README modify for Day2
</commit_message>
<xml_diff>
--- a/docs/2일차-20140402.pptx
+++ b/docs/2일차-20140402.pptx
@@ -6099,7 +6099,7 @@
         <p:spPr>
           <a:xfrm>
             <a:off x="1053310" y="3655101"/>
-            <a:ext cx="4140877" cy="523220"/>
+            <a:ext cx="4241867" cy="523220"/>
           </a:xfrm>
           <a:prstGeom prst="rect">
             <a:avLst/>
@@ -6141,7 +6141,7 @@
               <a:t>의 </a:t>
             </a:r>
             <a:r>
-              <a:rPr lang="en-US" altLang="ko-KR" sz="2800" b="1" dirty="0" smtClean="0">
+              <a:rPr lang="en-US" altLang="ko-KR" sz="2800" b="1" smtClean="0">
                 <a:solidFill>
                   <a:schemeClr val="tx1">
                     <a:lumMod val="85000"/>
@@ -6152,10 +6152,10 @@
                 <a:ea typeface="나눔고딕" pitchFamily="50" charset="-127"/>
                 <a:cs typeface="나눔고딕"/>
               </a:rPr>
-              <a:t>Class</a:t>
-            </a:r>
-            <a:r>
-              <a:rPr lang="ko-KR" altLang="en-US" sz="2800" b="1" dirty="0" smtClean="0">
+              <a:t>Class </a:t>
+            </a:r>
+            <a:r>
+              <a:rPr lang="ko-KR" altLang="en-US" sz="2800" b="1" smtClean="0">
                 <a:solidFill>
                   <a:schemeClr val="tx1">
                     <a:lumMod val="85000"/>

</xml_diff>